<commit_message>
Modification du ppt de description fonctionnelle et ajout excel des données de comptage
</commit_message>
<xml_diff>
--- a/Documentations/description_fonctionnelle_du_besoin.pptx
+++ b/Documentations/description_fonctionnelle_du_besoin.pptx
@@ -196,7 +196,7 @@
           <a:p>
             <a:fld id="{B12CD415-C79E-416B-8AE8-202FCBF8904E}" type="datetimeFigureOut">
               <a:rPr lang="fr-FR" smtClean="0"/>
-              <a:t>31/03/2020</a:t>
+              <a:t>01/04/2020</a:t>
             </a:fld>
             <a:endParaRPr lang="fr-FR"/>
           </a:p>
@@ -813,7 +813,7 @@
           <a:p>
             <a:fld id="{7DFFB93A-6C62-4102-BDB0-D496CBE497BD}" type="datetimeFigureOut">
               <a:rPr lang="fr-FR" smtClean="0"/>
-              <a:t>31/03/2020</a:t>
+              <a:t>01/04/2020</a:t>
             </a:fld>
             <a:endParaRPr lang="fr-FR"/>
           </a:p>
@@ -983,7 +983,7 @@
           <a:p>
             <a:fld id="{7DFFB93A-6C62-4102-BDB0-D496CBE497BD}" type="datetimeFigureOut">
               <a:rPr lang="fr-FR" smtClean="0"/>
-              <a:t>31/03/2020</a:t>
+              <a:t>01/04/2020</a:t>
             </a:fld>
             <a:endParaRPr lang="fr-FR"/>
           </a:p>
@@ -1163,7 +1163,7 @@
           <a:p>
             <a:fld id="{7DFFB93A-6C62-4102-BDB0-D496CBE497BD}" type="datetimeFigureOut">
               <a:rPr lang="fr-FR" smtClean="0"/>
-              <a:t>31/03/2020</a:t>
+              <a:t>01/04/2020</a:t>
             </a:fld>
             <a:endParaRPr lang="fr-FR"/>
           </a:p>
@@ -1333,7 +1333,7 @@
           <a:p>
             <a:fld id="{7DFFB93A-6C62-4102-BDB0-D496CBE497BD}" type="datetimeFigureOut">
               <a:rPr lang="fr-FR" smtClean="0"/>
-              <a:t>31/03/2020</a:t>
+              <a:t>01/04/2020</a:t>
             </a:fld>
             <a:endParaRPr lang="fr-FR"/>
           </a:p>
@@ -1579,7 +1579,7 @@
           <a:p>
             <a:fld id="{7DFFB93A-6C62-4102-BDB0-D496CBE497BD}" type="datetimeFigureOut">
               <a:rPr lang="fr-FR" smtClean="0"/>
-              <a:t>31/03/2020</a:t>
+              <a:t>01/04/2020</a:t>
             </a:fld>
             <a:endParaRPr lang="fr-FR"/>
           </a:p>
@@ -1867,7 +1867,7 @@
           <a:p>
             <a:fld id="{7DFFB93A-6C62-4102-BDB0-D496CBE497BD}" type="datetimeFigureOut">
               <a:rPr lang="fr-FR" smtClean="0"/>
-              <a:t>31/03/2020</a:t>
+              <a:t>01/04/2020</a:t>
             </a:fld>
             <a:endParaRPr lang="fr-FR"/>
           </a:p>
@@ -2289,7 +2289,7 @@
           <a:p>
             <a:fld id="{7DFFB93A-6C62-4102-BDB0-D496CBE497BD}" type="datetimeFigureOut">
               <a:rPr lang="fr-FR" smtClean="0"/>
-              <a:t>31/03/2020</a:t>
+              <a:t>01/04/2020</a:t>
             </a:fld>
             <a:endParaRPr lang="fr-FR"/>
           </a:p>
@@ -2407,7 +2407,7 @@
           <a:p>
             <a:fld id="{7DFFB93A-6C62-4102-BDB0-D496CBE497BD}" type="datetimeFigureOut">
               <a:rPr lang="fr-FR" smtClean="0"/>
-              <a:t>31/03/2020</a:t>
+              <a:t>01/04/2020</a:t>
             </a:fld>
             <a:endParaRPr lang="fr-FR"/>
           </a:p>
@@ -2502,7 +2502,7 @@
           <a:p>
             <a:fld id="{7DFFB93A-6C62-4102-BDB0-D496CBE497BD}" type="datetimeFigureOut">
               <a:rPr lang="fr-FR" smtClean="0"/>
-              <a:t>31/03/2020</a:t>
+              <a:t>01/04/2020</a:t>
             </a:fld>
             <a:endParaRPr lang="fr-FR"/>
           </a:p>
@@ -2779,7 +2779,7 @@
           <a:p>
             <a:fld id="{7DFFB93A-6C62-4102-BDB0-D496CBE497BD}" type="datetimeFigureOut">
               <a:rPr lang="fr-FR" smtClean="0"/>
-              <a:t>31/03/2020</a:t>
+              <a:t>01/04/2020</a:t>
             </a:fld>
             <a:endParaRPr lang="fr-FR"/>
           </a:p>
@@ -3032,7 +3032,7 @@
           <a:p>
             <a:fld id="{7DFFB93A-6C62-4102-BDB0-D496CBE497BD}" type="datetimeFigureOut">
               <a:rPr lang="fr-FR" smtClean="0"/>
-              <a:t>31/03/2020</a:t>
+              <a:t>01/04/2020</a:t>
             </a:fld>
             <a:endParaRPr lang="fr-FR"/>
           </a:p>
@@ -3245,7 +3245,7 @@
           <a:p>
             <a:fld id="{7DFFB93A-6C62-4102-BDB0-D496CBE497BD}" type="datetimeFigureOut">
               <a:rPr lang="fr-FR" smtClean="0"/>
-              <a:t>31/03/2020</a:t>
+              <a:t>01/04/2020</a:t>
             </a:fld>
             <a:endParaRPr lang="fr-FR"/>
           </a:p>
@@ -3629,14 +3629,14 @@
           <p:nvPr>
             <p:extLst>
               <p:ext uri="{D42A27DB-BD31-4B8C-83A1-F6EECF244321}">
-                <p14:modId xmlns:p14="http://schemas.microsoft.com/office/powerpoint/2010/main" val="4136898021"/>
+                <p14:modId xmlns:p14="http://schemas.microsoft.com/office/powerpoint/2010/main" val="3322237907"/>
               </p:ext>
             </p:extLst>
           </p:nvPr>
         </p:nvGraphicFramePr>
         <p:xfrm>
           <a:off x="395536" y="188640"/>
-          <a:ext cx="8496944" cy="5087352"/>
+          <a:ext cx="8496944" cy="5082272"/>
         </p:xfrm>
         <a:graphic>
           <a:graphicData uri="http://schemas.openxmlformats.org/drawingml/2006/table">
@@ -4264,7 +4264,7 @@
                   </a:tcPr>
                 </a:tc>
               </a:tr>
-              <a:tr h="370840">
+              <a:tr h="327640">
                 <a:tc>
                   <a:txBody>
                     <a:bodyPr/>
@@ -4286,7 +4286,7 @@
                     <a:p>
                       <a:r>
                         <a:rPr lang="fr-FR" dirty="0" smtClean="0"/>
-                        <a:t>M5</a:t>
+                        <a:t>M1</a:t>
                       </a:r>
                       <a:endParaRPr lang="fr-FR" dirty="0"/>
                     </a:p>
@@ -4470,7 +4470,7 @@
                     <a:p>
                       <a:r>
                         <a:rPr lang="fr-FR" dirty="0" smtClean="0"/>
-                        <a:t>0</a:t>
+                        <a:t>1</a:t>
                       </a:r>
                       <a:endParaRPr lang="fr-FR" dirty="0"/>
                     </a:p>
@@ -5177,7 +5177,7 @@
                     <a:p>
                       <a:r>
                         <a:rPr lang="fr-FR" dirty="0" smtClean="0"/>
-                        <a:t>M5</a:t>
+                        <a:t>M1</a:t>
                       </a:r>
                       <a:endParaRPr lang="fr-FR" dirty="0"/>
                     </a:p>
@@ -5452,7 +5452,7 @@
                     <a:p>
                       <a:r>
                         <a:rPr lang="fr-FR" dirty="0" smtClean="0"/>
-                        <a:t>0</a:t>
+                        <a:t>1</a:t>
                       </a:r>
                       <a:endParaRPr lang="fr-FR" dirty="0"/>
                     </a:p>
@@ -7297,8 +7297,8 @@
             <a:avLst/>
           </a:prstGeom>
           <a:ln w="6350">
-            <a:headEnd type="arrow"/>
-            <a:tailEnd type="arrow"/>
+            <a:headEnd type="triangle"/>
+            <a:tailEnd type="oval"/>
           </a:ln>
         </p:spPr>
         <p:style>
@@ -8300,7 +8300,7 @@
           </a:prstGeom>
           <a:ln w="6350">
             <a:headEnd type="arrow"/>
-            <a:tailEnd type="arrow"/>
+            <a:tailEnd type="oval"/>
           </a:ln>
         </p:spPr>
         <p:style>

</xml_diff>